<commit_message>
deleted unnecessary files and updated mockup and product backlog - working on Designdocument right now
</commit_message>
<xml_diff>
--- a/documents/MR2 Präsentation.pptx
+++ b/documents/MR2 Präsentation.pptx
@@ -201,7 +201,7 @@
           <a:p>
             <a:fld id="{D7171C24-5D38-4E49-A482-9782FCCADEC0}" type="datetimeFigureOut">
               <a:rPr lang="de-DE" smtClean="0"/>
-              <a:t>22.05.17</a:t>
+              <a:t>25.05.2017</a:t>
             </a:fld>
             <a:endParaRPr lang="de-DE"/>
           </a:p>
@@ -655,7 +655,7 @@
           <a:p>
             <a:fld id="{944C4F3D-D207-4070-86C5-DABDE1FFC9F6}" type="datetimeFigureOut">
               <a:rPr lang="de-AT" smtClean="0"/>
-              <a:t>22.05.17</a:t>
+              <a:t>25.05.2017</a:t>
             </a:fld>
             <a:endParaRPr lang="de-AT"/>
           </a:p>
@@ -930,7 +930,7 @@
           <a:p>
             <a:fld id="{944C4F3D-D207-4070-86C5-DABDE1FFC9F6}" type="datetimeFigureOut">
               <a:rPr lang="de-AT" smtClean="0"/>
-              <a:t>22.05.17</a:t>
+              <a:t>25.05.2017</a:t>
             </a:fld>
             <a:endParaRPr lang="de-AT"/>
           </a:p>
@@ -1124,7 +1124,7 @@
           <a:p>
             <a:fld id="{944C4F3D-D207-4070-86C5-DABDE1FFC9F6}" type="datetimeFigureOut">
               <a:rPr lang="de-AT" smtClean="0"/>
-              <a:t>22.05.17</a:t>
+              <a:t>25.05.2017</a:t>
             </a:fld>
             <a:endParaRPr lang="de-AT"/>
           </a:p>
@@ -1397,7 +1397,7 @@
           <a:p>
             <a:fld id="{944C4F3D-D207-4070-86C5-DABDE1FFC9F6}" type="datetimeFigureOut">
               <a:rPr lang="de-AT" smtClean="0"/>
-              <a:t>22.05.17</a:t>
+              <a:t>25.05.2017</a:t>
             </a:fld>
             <a:endParaRPr lang="de-AT"/>
           </a:p>
@@ -1738,7 +1738,7 @@
           <a:p>
             <a:fld id="{944C4F3D-D207-4070-86C5-DABDE1FFC9F6}" type="datetimeFigureOut">
               <a:rPr lang="de-AT" smtClean="0"/>
-              <a:t>22.05.17</a:t>
+              <a:t>25.05.2017</a:t>
             </a:fld>
             <a:endParaRPr lang="de-AT"/>
           </a:p>
@@ -2361,7 +2361,7 @@
           <a:p>
             <a:fld id="{944C4F3D-D207-4070-86C5-DABDE1FFC9F6}" type="datetimeFigureOut">
               <a:rPr lang="de-AT" smtClean="0"/>
-              <a:t>22.05.17</a:t>
+              <a:t>25.05.2017</a:t>
             </a:fld>
             <a:endParaRPr lang="de-AT"/>
           </a:p>
@@ -3221,7 +3221,7 @@
           <a:p>
             <a:fld id="{944C4F3D-D207-4070-86C5-DABDE1FFC9F6}" type="datetimeFigureOut">
               <a:rPr lang="de-AT" smtClean="0"/>
-              <a:t>22.05.17</a:t>
+              <a:t>25.05.2017</a:t>
             </a:fld>
             <a:endParaRPr lang="de-AT"/>
           </a:p>
@@ -3391,7 +3391,7 @@
           <a:p>
             <a:fld id="{944C4F3D-D207-4070-86C5-DABDE1FFC9F6}" type="datetimeFigureOut">
               <a:rPr lang="de-AT" smtClean="0"/>
-              <a:t>22.05.17</a:t>
+              <a:t>25.05.2017</a:t>
             </a:fld>
             <a:endParaRPr lang="de-AT"/>
           </a:p>
@@ -3571,7 +3571,7 @@
           <a:p>
             <a:fld id="{944C4F3D-D207-4070-86C5-DABDE1FFC9F6}" type="datetimeFigureOut">
               <a:rPr lang="de-AT" smtClean="0"/>
-              <a:t>22.05.17</a:t>
+              <a:t>25.05.2017</a:t>
             </a:fld>
             <a:endParaRPr lang="de-AT"/>
           </a:p>
@@ -3741,7 +3741,7 @@
           <a:p>
             <a:fld id="{944C4F3D-D207-4070-86C5-DABDE1FFC9F6}" type="datetimeFigureOut">
               <a:rPr lang="de-AT" smtClean="0"/>
-              <a:t>22.05.17</a:t>
+              <a:t>25.05.2017</a:t>
             </a:fld>
             <a:endParaRPr lang="de-AT"/>
           </a:p>
@@ -3988,7 +3988,7 @@
           <a:p>
             <a:fld id="{944C4F3D-D207-4070-86C5-DABDE1FFC9F6}" type="datetimeFigureOut">
               <a:rPr lang="de-AT" smtClean="0"/>
-              <a:t>22.05.17</a:t>
+              <a:t>25.05.2017</a:t>
             </a:fld>
             <a:endParaRPr lang="de-AT"/>
           </a:p>
@@ -4280,7 +4280,7 @@
           <a:p>
             <a:fld id="{944C4F3D-D207-4070-86C5-DABDE1FFC9F6}" type="datetimeFigureOut">
               <a:rPr lang="de-AT" smtClean="0"/>
-              <a:t>22.05.17</a:t>
+              <a:t>25.05.2017</a:t>
             </a:fld>
             <a:endParaRPr lang="de-AT"/>
           </a:p>
@@ -4724,7 +4724,7 @@
           <a:p>
             <a:fld id="{944C4F3D-D207-4070-86C5-DABDE1FFC9F6}" type="datetimeFigureOut">
               <a:rPr lang="de-AT" smtClean="0"/>
-              <a:t>22.05.17</a:t>
+              <a:t>25.05.2017</a:t>
             </a:fld>
             <a:endParaRPr lang="de-AT"/>
           </a:p>
@@ -4842,7 +4842,7 @@
           <a:p>
             <a:fld id="{944C4F3D-D207-4070-86C5-DABDE1FFC9F6}" type="datetimeFigureOut">
               <a:rPr lang="de-AT" smtClean="0"/>
-              <a:t>22.05.17</a:t>
+              <a:t>25.05.2017</a:t>
             </a:fld>
             <a:endParaRPr lang="de-AT"/>
           </a:p>
@@ -4937,7 +4937,7 @@
           <a:p>
             <a:fld id="{944C4F3D-D207-4070-86C5-DABDE1FFC9F6}" type="datetimeFigureOut">
               <a:rPr lang="de-AT" smtClean="0"/>
-              <a:t>22.05.17</a:t>
+              <a:t>25.05.2017</a:t>
             </a:fld>
             <a:endParaRPr lang="de-AT"/>
           </a:p>
@@ -5216,7 +5216,7 @@
           <a:p>
             <a:fld id="{944C4F3D-D207-4070-86C5-DABDE1FFC9F6}" type="datetimeFigureOut">
               <a:rPr lang="de-AT" smtClean="0"/>
-              <a:t>22.05.17</a:t>
+              <a:t>25.05.2017</a:t>
             </a:fld>
             <a:endParaRPr lang="de-AT"/>
           </a:p>
@@ -5491,7 +5491,7 @@
           <a:p>
             <a:fld id="{944C4F3D-D207-4070-86C5-DABDE1FFC9F6}" type="datetimeFigureOut">
               <a:rPr lang="de-AT" smtClean="0"/>
-              <a:t>22.05.17</a:t>
+              <a:t>25.05.2017</a:t>
             </a:fld>
             <a:endParaRPr lang="de-AT"/>
           </a:p>
@@ -5920,7 +5920,7 @@
           <a:p>
             <a:fld id="{944C4F3D-D207-4070-86C5-DABDE1FFC9F6}" type="datetimeFigureOut">
               <a:rPr lang="de-AT" smtClean="0"/>
-              <a:t>22.05.17</a:t>
+              <a:t>25.05.2017</a:t>
             </a:fld>
             <a:endParaRPr lang="de-AT"/>
           </a:p>
@@ -6581,7 +6581,7 @@
             <p:ph idx="1"/>
             <p:extLst>
               <p:ext uri="{D42A27DB-BD31-4B8C-83A1-F6EECF244321}">
-                <p14:modId xmlns:p14="http://schemas.microsoft.com/office/powerpoint/2010/main" val="1089448135"/>
+                <p14:modId xmlns:p14="http://schemas.microsoft.com/office/powerpoint/2010/main" val="1991765391"/>
               </p:ext>
             </p:extLst>
           </p:nvPr>
@@ -6597,9 +6597,27 @@
                 <a:tableStyleId>{5C22544A-7EE6-4342-B048-85BDC9FD1C3A}</a:tableStyleId>
               </a:tblPr>
               <a:tblGrid>
-                <a:gridCol w="4229541"/>
-                <a:gridCol w="1214422"/>
-                <a:gridCol w="2735940"/>
+                <a:gridCol w="4229541">
+                  <a:extLst>
+                    <a:ext uri="{9D8B030D-6E8A-4147-A177-3AD203B41FA5}">
+                      <a16:colId xmlns:a16="http://schemas.microsoft.com/office/drawing/2014/main" val="20000"/>
+                    </a:ext>
+                  </a:extLst>
+                </a:gridCol>
+                <a:gridCol w="1214422">
+                  <a:extLst>
+                    <a:ext uri="{9D8B030D-6E8A-4147-A177-3AD203B41FA5}">
+                      <a16:colId xmlns:a16="http://schemas.microsoft.com/office/drawing/2014/main" val="20001"/>
+                    </a:ext>
+                  </a:extLst>
+                </a:gridCol>
+                <a:gridCol w="2735940">
+                  <a:extLst>
+                    <a:ext uri="{9D8B030D-6E8A-4147-A177-3AD203B41FA5}">
+                      <a16:colId xmlns:a16="http://schemas.microsoft.com/office/drawing/2014/main" val="20002"/>
+                    </a:ext>
+                  </a:extLst>
+                </a:gridCol>
               </a:tblGrid>
               <a:tr h="418308">
                 <a:tc>
@@ -6609,7 +6627,7 @@
                     <a:p>
                       <a:pPr algn="l" fontAlgn="b"/>
                       <a:r>
-                        <a:rPr lang="de-DE" sz="1100" u="none" strike="noStrike">
+                        <a:rPr lang="de-DE" sz="1200" u="none" strike="noStrike">
                           <a:solidFill>
                             <a:schemeClr val="accent4">
                               <a:lumMod val="75000"/>
@@ -6619,7 +6637,7 @@
                         </a:rPr>
                         <a:t>Kunden anlegen</a:t>
                       </a:r>
-                      <a:endParaRPr lang="de-DE" sz="1100" b="0" i="0" u="none" strike="noStrike">
+                      <a:endParaRPr lang="de-DE" sz="1200" b="0" i="0" u="none" strike="noStrike">
                         <a:solidFill>
                           <a:schemeClr val="accent4">
                             <a:lumMod val="75000"/>
@@ -6639,7 +6657,7 @@
                     <a:p>
                       <a:pPr algn="ctr" fontAlgn="ctr"/>
                       <a:r>
-                        <a:rPr lang="de-DE" sz="1100" u="none" strike="noStrike">
+                        <a:rPr lang="de-DE" sz="1200" u="none" strike="noStrike">
                           <a:solidFill>
                             <a:schemeClr val="accent4">
                               <a:lumMod val="75000"/>
@@ -6649,7 +6667,7 @@
                         </a:rPr>
                         <a:t>4</a:t>
                       </a:r>
-                      <a:endParaRPr lang="de-DE" sz="1100" b="0" i="0" u="none" strike="noStrike">
+                      <a:endParaRPr lang="de-DE" sz="1200" b="0" i="0" u="none" strike="noStrike">
                         <a:solidFill>
                           <a:schemeClr val="accent4">
                             <a:lumMod val="75000"/>
@@ -6669,7 +6687,7 @@
                     <a:p>
                       <a:pPr algn="l" fontAlgn="b"/>
                       <a:r>
-                        <a:rPr lang="de-DE" sz="1100" u="none" strike="noStrike">
+                        <a:rPr lang="de-DE" sz="1200" u="none" strike="noStrike">
                           <a:solidFill>
                             <a:schemeClr val="accent4">
                               <a:lumMod val="75000"/>
@@ -6679,7 +6697,7 @@
                         </a:rPr>
                         <a:t>Calvin/Martin</a:t>
                       </a:r>
-                      <a:endParaRPr lang="de-DE" sz="1100" b="0" i="0" u="none" strike="noStrike">
+                      <a:endParaRPr lang="de-DE" sz="1200" b="0" i="0" u="none" strike="noStrike">
                         <a:solidFill>
                           <a:schemeClr val="accent4">
                             <a:lumMod val="75000"/>
@@ -6692,6 +6710,11 @@
                   </a:txBody>
                   <a:tcPr marL="6350" marR="6350" marT="6350" marB="0" anchor="b"/>
                 </a:tc>
+                <a:extLst>
+                  <a:ext uri="{0D108BD9-81ED-4DB2-BD59-A6C34878D82A}">
+                    <a16:rowId xmlns:a16="http://schemas.microsoft.com/office/drawing/2014/main" val="10000"/>
+                  </a:ext>
+                </a:extLst>
               </a:tr>
               <a:tr h="418308">
                 <a:tc>
@@ -6701,7 +6724,7 @@
                     <a:p>
                       <a:pPr algn="l" fontAlgn="b"/>
                       <a:r>
-                        <a:rPr lang="de-DE" sz="1100" u="none" strike="noStrike">
+                        <a:rPr lang="de-DE" sz="1200" u="none" strike="noStrike">
                           <a:solidFill>
                             <a:schemeClr val="accent4">
                               <a:lumMod val="75000"/>
@@ -6711,7 +6734,7 @@
                         </a:rPr>
                         <a:t>Kunde bearbeiten</a:t>
                       </a:r>
-                      <a:endParaRPr lang="de-DE" sz="1100" b="0" i="0" u="none" strike="noStrike">
+                      <a:endParaRPr lang="de-DE" sz="1200" b="0" i="0" u="none" strike="noStrike">
                         <a:solidFill>
                           <a:schemeClr val="accent4">
                             <a:lumMod val="75000"/>
@@ -6731,7 +6754,7 @@
                     <a:p>
                       <a:pPr algn="ctr" fontAlgn="ctr"/>
                       <a:r>
-                        <a:rPr lang="de-DE" sz="1100" u="none" strike="noStrike">
+                        <a:rPr lang="de-DE" sz="1200" u="none" strike="noStrike">
                           <a:solidFill>
                             <a:schemeClr val="accent4">
                               <a:lumMod val="75000"/>
@@ -6741,7 +6764,7 @@
                         </a:rPr>
                         <a:t>3</a:t>
                       </a:r>
-                      <a:endParaRPr lang="de-DE" sz="1100" b="0" i="0" u="none" strike="noStrike">
+                      <a:endParaRPr lang="de-DE" sz="1200" b="0" i="0" u="none" strike="noStrike">
                         <a:solidFill>
                           <a:schemeClr val="accent4">
                             <a:lumMod val="75000"/>
@@ -6761,7 +6784,7 @@
                     <a:p>
                       <a:pPr algn="l" fontAlgn="b"/>
                       <a:r>
-                        <a:rPr lang="de-DE" sz="1100" u="none" strike="noStrike">
+                        <a:rPr lang="de-DE" sz="1200" u="none" strike="noStrike">
                           <a:solidFill>
                             <a:schemeClr val="accent4">
                               <a:lumMod val="75000"/>
@@ -6771,7 +6794,7 @@
                         </a:rPr>
                         <a:t>Calvin/Martin</a:t>
                       </a:r>
-                      <a:endParaRPr lang="de-DE" sz="1100" b="0" i="0" u="none" strike="noStrike">
+                      <a:endParaRPr lang="de-DE" sz="1200" b="0" i="0" u="none" strike="noStrike">
                         <a:solidFill>
                           <a:schemeClr val="accent4">
                             <a:lumMod val="75000"/>
@@ -6784,6 +6807,11 @@
                   </a:txBody>
                   <a:tcPr marL="6350" marR="6350" marT="6350" marB="0" anchor="b"/>
                 </a:tc>
+                <a:extLst>
+                  <a:ext uri="{0D108BD9-81ED-4DB2-BD59-A6C34878D82A}">
+                    <a16:rowId xmlns:a16="http://schemas.microsoft.com/office/drawing/2014/main" val="10001"/>
+                  </a:ext>
+                </a:extLst>
               </a:tr>
               <a:tr h="392163">
                 <a:tc>
@@ -6793,7 +6821,7 @@
                     <a:p>
                       <a:pPr algn="l" fontAlgn="b"/>
                       <a:r>
-                        <a:rPr lang="de-DE" sz="1100" u="none" strike="noStrike">
+                        <a:rPr lang="de-DE" sz="1200" u="none" strike="noStrike" dirty="0">
                           <a:solidFill>
                             <a:schemeClr val="accent4">
                               <a:lumMod val="75000"/>
@@ -6803,7 +6831,7 @@
                         </a:rPr>
                         <a:t>Veranstaltungen/Performances anzeigen</a:t>
                       </a:r>
-                      <a:endParaRPr lang="de-DE" sz="1100" b="0" i="0" u="none" strike="noStrike">
+                      <a:endParaRPr lang="de-DE" sz="1200" b="0" i="0" u="none" strike="noStrike" dirty="0">
                         <a:solidFill>
                           <a:schemeClr val="accent4">
                             <a:lumMod val="75000"/>
@@ -6823,7 +6851,7 @@
                     <a:p>
                       <a:pPr algn="ctr" fontAlgn="ctr"/>
                       <a:r>
-                        <a:rPr lang="de-DE" sz="1100" u="none" strike="noStrike">
+                        <a:rPr lang="de-DE" sz="1200" u="none" strike="noStrike">
                           <a:solidFill>
                             <a:schemeClr val="accent4">
                               <a:lumMod val="75000"/>
@@ -6833,7 +6861,7 @@
                         </a:rPr>
                         <a:t>4</a:t>
                       </a:r>
-                      <a:endParaRPr lang="de-DE" sz="1100" b="0" i="0" u="none" strike="noStrike">
+                      <a:endParaRPr lang="de-DE" sz="1200" b="0" i="0" u="none" strike="noStrike">
                         <a:solidFill>
                           <a:schemeClr val="accent4">
                             <a:lumMod val="75000"/>
@@ -6853,7 +6881,7 @@
                     <a:p>
                       <a:pPr algn="l" fontAlgn="b"/>
                       <a:r>
-                        <a:rPr lang="de-DE" sz="1100" u="none" strike="noStrike">
+                        <a:rPr lang="de-DE" sz="1200" u="none" strike="noStrike">
                           <a:solidFill>
                             <a:schemeClr val="accent4">
                               <a:lumMod val="75000"/>
@@ -6863,7 +6891,7 @@
                         </a:rPr>
                         <a:t>Alex / Benni</a:t>
                       </a:r>
-                      <a:endParaRPr lang="de-DE" sz="1100" b="0" i="0" u="none" strike="noStrike">
+                      <a:endParaRPr lang="de-DE" sz="1200" b="0" i="0" u="none" strike="noStrike">
                         <a:solidFill>
                           <a:schemeClr val="accent4">
                             <a:lumMod val="75000"/>
@@ -6876,6 +6904,11 @@
                   </a:txBody>
                   <a:tcPr marL="6350" marR="6350" marT="6350" marB="0" anchor="b"/>
                 </a:tc>
+                <a:extLst>
+                  <a:ext uri="{0D108BD9-81ED-4DB2-BD59-A6C34878D82A}">
+                    <a16:rowId xmlns:a16="http://schemas.microsoft.com/office/drawing/2014/main" val="10002"/>
+                  </a:ext>
+                </a:extLst>
               </a:tr>
               <a:tr h="392163">
                 <a:tc>
@@ -6885,7 +6918,7 @@
                     <a:p>
                       <a:pPr algn="l" fontAlgn="b"/>
                       <a:r>
-                        <a:rPr lang="de-DE" sz="1100" u="none" strike="noStrike">
+                        <a:rPr lang="de-DE" sz="1200" u="none" strike="noStrike">
                           <a:solidFill>
                             <a:schemeClr val="accent4">
                               <a:lumMod val="75000"/>
@@ -6895,7 +6928,7 @@
                         </a:rPr>
                         <a:t>Saalplan Sektoren</a:t>
                       </a:r>
-                      <a:endParaRPr lang="de-DE" sz="1100" b="0" i="0" u="none" strike="noStrike">
+                      <a:endParaRPr lang="de-DE" sz="1200" b="0" i="0" u="none" strike="noStrike">
                         <a:solidFill>
                           <a:schemeClr val="accent4">
                             <a:lumMod val="75000"/>
@@ -6915,7 +6948,7 @@
                     <a:p>
                       <a:pPr algn="ctr" fontAlgn="ctr"/>
                       <a:r>
-                        <a:rPr lang="de-DE" sz="1100" u="none" strike="noStrike">
+                        <a:rPr lang="de-DE" sz="1200" u="none" strike="noStrike">
                           <a:solidFill>
                             <a:schemeClr val="accent4">
                               <a:lumMod val="75000"/>
@@ -6925,7 +6958,7 @@
                         </a:rPr>
                         <a:t>14</a:t>
                       </a:r>
-                      <a:endParaRPr lang="de-DE" sz="1100" b="0" i="0" u="none" strike="noStrike">
+                      <a:endParaRPr lang="de-DE" sz="1200" b="0" i="0" u="none" strike="noStrike">
                         <a:solidFill>
                           <a:schemeClr val="accent4">
                             <a:lumMod val="75000"/>
@@ -6945,7 +6978,7 @@
                     <a:p>
                       <a:pPr algn="l" fontAlgn="b"/>
                       <a:r>
-                        <a:rPr lang="de-DE" sz="1100" u="none" strike="noStrike">
+                        <a:rPr lang="de-DE" sz="1200" u="none" strike="noStrike">
                           <a:solidFill>
                             <a:schemeClr val="accent4">
                               <a:lumMod val="75000"/>
@@ -6955,7 +6988,7 @@
                         </a:rPr>
                         <a:t>Alex / Benni</a:t>
                       </a:r>
-                      <a:endParaRPr lang="de-DE" sz="1100" b="0" i="0" u="none" strike="noStrike">
+                      <a:endParaRPr lang="de-DE" sz="1200" b="0" i="0" u="none" strike="noStrike">
                         <a:solidFill>
                           <a:schemeClr val="accent4">
                             <a:lumMod val="75000"/>
@@ -6968,6 +7001,11 @@
                   </a:txBody>
                   <a:tcPr marL="6350" marR="6350" marT="6350" marB="0" anchor="b"/>
                 </a:tc>
+                <a:extLst>
+                  <a:ext uri="{0D108BD9-81ED-4DB2-BD59-A6C34878D82A}">
+                    <a16:rowId xmlns:a16="http://schemas.microsoft.com/office/drawing/2014/main" val="10003"/>
+                  </a:ext>
+                </a:extLst>
               </a:tr>
               <a:tr h="784327">
                 <a:tc>
@@ -6977,7 +7015,7 @@
                     <a:p>
                       <a:pPr algn="l" fontAlgn="b"/>
                       <a:r>
-                        <a:rPr lang="de-DE" sz="1100" u="none" strike="noStrike">
+                        <a:rPr lang="de-DE" sz="1200" u="none" strike="noStrike">
                           <a:solidFill>
                             <a:schemeClr val="accent4">
                               <a:lumMod val="75000"/>
@@ -6988,7 +7026,7 @@
                         <a:t>Detailansicht von Reservierungen/</a:t>
                       </a:r>
                       <a:br>
-                        <a:rPr lang="de-DE" sz="1100" u="none" strike="noStrike">
+                        <a:rPr lang="de-DE" sz="1200" u="none" strike="noStrike">
                           <a:solidFill>
                             <a:schemeClr val="accent4">
                               <a:lumMod val="75000"/>
@@ -6998,7 +7036,7 @@
                         </a:rPr>
                       </a:br>
                       <a:r>
-                        <a:rPr lang="de-DE" sz="1100" u="none" strike="noStrike">
+                        <a:rPr lang="de-DE" sz="1200" u="none" strike="noStrike">
                           <a:solidFill>
                             <a:schemeClr val="accent4">
                               <a:lumMod val="75000"/>
@@ -7008,7 +7046,7 @@
                         </a:rPr>
                         <a:t>Verkäufe inkl. Customer Selection</a:t>
                       </a:r>
-                      <a:endParaRPr lang="de-DE" sz="1100" b="0" i="0" u="none" strike="noStrike">
+                      <a:endParaRPr lang="de-DE" sz="1200" b="0" i="0" u="none" strike="noStrike">
                         <a:solidFill>
                           <a:schemeClr val="accent4">
                             <a:lumMod val="75000"/>
@@ -7028,7 +7066,7 @@
                     <a:p>
                       <a:pPr algn="ctr" fontAlgn="ctr"/>
                       <a:r>
-                        <a:rPr lang="de-DE" sz="1100" u="none" strike="noStrike">
+                        <a:rPr lang="de-DE" sz="1200" u="none" strike="noStrike">
                           <a:solidFill>
                             <a:schemeClr val="accent4">
                               <a:lumMod val="75000"/>
@@ -7038,7 +7076,7 @@
                         </a:rPr>
                         <a:t>5</a:t>
                       </a:r>
-                      <a:endParaRPr lang="de-DE" sz="1100" b="0" i="0" u="none" strike="noStrike">
+                      <a:endParaRPr lang="de-DE" sz="1200" b="0" i="0" u="none" strike="noStrike">
                         <a:solidFill>
                           <a:schemeClr val="accent4">
                             <a:lumMod val="75000"/>
@@ -7058,7 +7096,7 @@
                     <a:p>
                       <a:pPr algn="l" fontAlgn="ctr"/>
                       <a:r>
-                        <a:rPr lang="de-DE" sz="1100" u="none" strike="noStrike">
+                        <a:rPr lang="de-DE" sz="1200" u="none" strike="noStrike">
                           <a:solidFill>
                             <a:schemeClr val="accent4">
                               <a:lumMod val="75000"/>
@@ -7068,7 +7106,7 @@
                         </a:rPr>
                         <a:t>Martin/Calvin</a:t>
                       </a:r>
-                      <a:endParaRPr lang="de-DE" sz="1100" b="0" i="0" u="none" strike="noStrike">
+                      <a:endParaRPr lang="de-DE" sz="1200" b="0" i="0" u="none" strike="noStrike">
                         <a:solidFill>
                           <a:schemeClr val="accent4">
                             <a:lumMod val="75000"/>
@@ -7081,6 +7119,11 @@
                   </a:txBody>
                   <a:tcPr marL="6350" marR="6350" marT="6350" marB="0" anchor="ctr"/>
                 </a:tc>
+                <a:extLst>
+                  <a:ext uri="{0D108BD9-81ED-4DB2-BD59-A6C34878D82A}">
+                    <a16:rowId xmlns:a16="http://schemas.microsoft.com/office/drawing/2014/main" val="10004"/>
+                  </a:ext>
+                </a:extLst>
               </a:tr>
               <a:tr h="392163">
                 <a:tc>
@@ -7090,7 +7133,7 @@
                     <a:p>
                       <a:pPr algn="l" fontAlgn="b"/>
                       <a:r>
-                        <a:rPr lang="de-DE" sz="1100" u="none" strike="noStrike">
+                        <a:rPr lang="de-DE" sz="1200" u="none" strike="noStrike">
                           <a:solidFill>
                             <a:schemeClr val="accent4">
                               <a:lumMod val="75000"/>
@@ -7100,7 +7143,7 @@
                         </a:rPr>
                         <a:t>Ticketverkauf, serverseitig</a:t>
                       </a:r>
-                      <a:endParaRPr lang="de-DE" sz="1100" b="0" i="0" u="none" strike="noStrike">
+                      <a:endParaRPr lang="de-DE" sz="1200" b="0" i="0" u="none" strike="noStrike">
                         <a:solidFill>
                           <a:schemeClr val="accent4">
                             <a:lumMod val="75000"/>
@@ -7120,7 +7163,7 @@
                     <a:p>
                       <a:pPr algn="ctr" fontAlgn="b"/>
                       <a:r>
-                        <a:rPr lang="de-DE" sz="1100" u="none" strike="noStrike">
+                        <a:rPr lang="de-DE" sz="1200" u="none" strike="noStrike">
                           <a:solidFill>
                             <a:schemeClr val="accent4">
                               <a:lumMod val="75000"/>
@@ -7130,7 +7173,7 @@
                         </a:rPr>
                         <a:t>3</a:t>
                       </a:r>
-                      <a:endParaRPr lang="de-DE" sz="1100" b="0" i="0" u="none" strike="noStrike">
+                      <a:endParaRPr lang="de-DE" sz="1200" b="0" i="0" u="none" strike="noStrike">
                         <a:solidFill>
                           <a:schemeClr val="accent4">
                             <a:lumMod val="75000"/>
@@ -7150,7 +7193,7 @@
                     <a:p>
                       <a:pPr algn="l" fontAlgn="b"/>
                       <a:r>
-                        <a:rPr lang="de-DE" sz="1100" u="none" strike="noStrike">
+                        <a:rPr lang="de-DE" sz="1200" u="none" strike="noStrike">
                           <a:solidFill>
                             <a:schemeClr val="accent4">
                               <a:lumMod val="75000"/>
@@ -7160,7 +7203,7 @@
                         </a:rPr>
                         <a:t>Christopher</a:t>
                       </a:r>
-                      <a:endParaRPr lang="de-DE" sz="1100" b="0" i="0" u="none" strike="noStrike">
+                      <a:endParaRPr lang="de-DE" sz="1200" b="0" i="0" u="none" strike="noStrike">
                         <a:solidFill>
                           <a:schemeClr val="accent4">
                             <a:lumMod val="75000"/>
@@ -7173,6 +7216,11 @@
                   </a:txBody>
                   <a:tcPr marL="6350" marR="6350" marT="6350" marB="0" anchor="b"/>
                 </a:tc>
+                <a:extLst>
+                  <a:ext uri="{0D108BD9-81ED-4DB2-BD59-A6C34878D82A}">
+                    <a16:rowId xmlns:a16="http://schemas.microsoft.com/office/drawing/2014/main" val="10005"/>
+                  </a:ext>
+                </a:extLst>
               </a:tr>
               <a:tr h="392163">
                 <a:tc>
@@ -7182,7 +7230,7 @@
                     <a:p>
                       <a:pPr algn="l" fontAlgn="b"/>
                       <a:r>
-                        <a:rPr lang="de-DE" sz="1100" u="none" strike="noStrike">
+                        <a:rPr lang="de-DE" sz="1200" u="none" strike="noStrike">
                           <a:solidFill>
                             <a:schemeClr val="accent4">
                               <a:lumMod val="75000"/>
@@ -7192,7 +7240,7 @@
                         </a:rPr>
                         <a:t>Ticketreservierungen, serverseitig</a:t>
                       </a:r>
-                      <a:endParaRPr lang="de-DE" sz="1100" b="0" i="0" u="none" strike="noStrike">
+                      <a:endParaRPr lang="de-DE" sz="1200" b="0" i="0" u="none" strike="noStrike">
                         <a:solidFill>
                           <a:schemeClr val="accent4">
                             <a:lumMod val="75000"/>
@@ -7212,7 +7260,7 @@
                     <a:p>
                       <a:pPr algn="ctr" fontAlgn="ctr"/>
                       <a:r>
-                        <a:rPr lang="de-DE" sz="1100" u="none" strike="noStrike">
+                        <a:rPr lang="de-DE" sz="1200" u="none" strike="noStrike">
                           <a:solidFill>
                             <a:schemeClr val="accent4">
                               <a:lumMod val="75000"/>
@@ -7222,7 +7270,7 @@
                         </a:rPr>
                         <a:t>3</a:t>
                       </a:r>
-                      <a:endParaRPr lang="de-DE" sz="1100" b="0" i="0" u="none" strike="noStrike">
+                      <a:endParaRPr lang="de-DE" sz="1200" b="0" i="0" u="none" strike="noStrike">
                         <a:solidFill>
                           <a:schemeClr val="accent4">
                             <a:lumMod val="75000"/>
@@ -7242,7 +7290,7 @@
                     <a:p>
                       <a:pPr algn="l" fontAlgn="b"/>
                       <a:r>
-                        <a:rPr lang="de-DE" sz="1100" u="none" strike="noStrike">
+                        <a:rPr lang="de-DE" sz="1200" u="none" strike="noStrike">
                           <a:solidFill>
                             <a:schemeClr val="accent4">
                               <a:lumMod val="75000"/>
@@ -7252,7 +7300,7 @@
                         </a:rPr>
                         <a:t>Christopher</a:t>
                       </a:r>
-                      <a:endParaRPr lang="de-DE" sz="1100" b="0" i="0" u="none" strike="noStrike">
+                      <a:endParaRPr lang="de-DE" sz="1200" b="0" i="0" u="none" strike="noStrike">
                         <a:solidFill>
                           <a:schemeClr val="accent4">
                             <a:lumMod val="75000"/>
@@ -7265,6 +7313,11 @@
                   </a:txBody>
                   <a:tcPr marL="6350" marR="6350" marT="6350" marB="0" anchor="b"/>
                 </a:tc>
+                <a:extLst>
+                  <a:ext uri="{0D108BD9-81ED-4DB2-BD59-A6C34878D82A}">
+                    <a16:rowId xmlns:a16="http://schemas.microsoft.com/office/drawing/2014/main" val="10006"/>
+                  </a:ext>
+                </a:extLst>
               </a:tr>
               <a:tr h="418308">
                 <a:tc>
@@ -7274,7 +7327,7 @@
                     <a:p>
                       <a:pPr algn="l" fontAlgn="b"/>
                       <a:r>
-                        <a:rPr lang="de-DE" sz="1100" u="none" strike="noStrike" dirty="0">
+                        <a:rPr lang="de-DE" sz="1200" u="none" strike="noStrike" dirty="0">
                           <a:solidFill>
                             <a:schemeClr val="accent4">
                               <a:lumMod val="75000"/>
@@ -7284,7 +7337,7 @@
                         </a:rPr>
                         <a:t>Reservierungen/Verkäufe anzeigen</a:t>
                       </a:r>
-                      <a:endParaRPr lang="de-DE" sz="1100" b="0" i="0" u="none" strike="noStrike" dirty="0">
+                      <a:endParaRPr lang="de-DE" sz="1200" b="0" i="0" u="none" strike="noStrike" dirty="0">
                         <a:solidFill>
                           <a:schemeClr val="accent4">
                             <a:lumMod val="75000"/>
@@ -7304,7 +7357,7 @@
                     <a:p>
                       <a:pPr algn="ctr" fontAlgn="ctr"/>
                       <a:r>
-                        <a:rPr lang="de-DE" sz="1100" u="none" strike="noStrike">
+                        <a:rPr lang="de-DE" sz="1200" u="none" strike="noStrike">
                           <a:solidFill>
                             <a:schemeClr val="accent4">
                               <a:lumMod val="75000"/>
@@ -7314,7 +7367,7 @@
                         </a:rPr>
                         <a:t>4</a:t>
                       </a:r>
-                      <a:endParaRPr lang="de-DE" sz="1100" b="0" i="0" u="none" strike="noStrike">
+                      <a:endParaRPr lang="de-DE" sz="1200" b="0" i="0" u="none" strike="noStrike">
                         <a:solidFill>
                           <a:schemeClr val="accent4">
                             <a:lumMod val="75000"/>
@@ -7334,7 +7387,7 @@
                     <a:p>
                       <a:pPr algn="l" fontAlgn="b"/>
                       <a:r>
-                        <a:rPr lang="de-DE" sz="1100" u="none" strike="noStrike" dirty="0">
+                        <a:rPr lang="de-DE" sz="1200" u="none" strike="noStrike" dirty="0">
                           <a:solidFill>
                             <a:schemeClr val="accent4">
                               <a:lumMod val="75000"/>
@@ -7344,7 +7397,7 @@
                         </a:rPr>
                         <a:t>Martin</a:t>
                       </a:r>
-                      <a:endParaRPr lang="de-DE" sz="1100" b="0" i="0" u="none" strike="noStrike" dirty="0">
+                      <a:endParaRPr lang="de-DE" sz="1200" b="0" i="0" u="none" strike="noStrike" dirty="0">
                         <a:solidFill>
                           <a:schemeClr val="accent4">
                             <a:lumMod val="75000"/>
@@ -7357,6 +7410,11 @@
                   </a:txBody>
                   <a:tcPr marL="6350" marR="6350" marT="6350" marB="0" anchor="b"/>
                 </a:tc>
+                <a:extLst>
+                  <a:ext uri="{0D108BD9-81ED-4DB2-BD59-A6C34878D82A}">
+                    <a16:rowId xmlns:a16="http://schemas.microsoft.com/office/drawing/2014/main" val="10007"/>
+                  </a:ext>
+                </a:extLst>
               </a:tr>
             </a:tbl>
           </a:graphicData>
@@ -7448,7 +7506,7 @@
             <p:ph idx="1"/>
             <p:extLst>
               <p:ext uri="{D42A27DB-BD31-4B8C-83A1-F6EECF244321}">
-                <p14:modId xmlns:p14="http://schemas.microsoft.com/office/powerpoint/2010/main" val="811990197"/>
+                <p14:modId xmlns:p14="http://schemas.microsoft.com/office/powerpoint/2010/main" val="2914470911"/>
               </p:ext>
             </p:extLst>
           </p:nvPr>
@@ -7464,8 +7522,20 @@
                 <a:tableStyleId>{5C22544A-7EE6-4342-B048-85BDC9FD1C3A}</a:tableStyleId>
               </a:tblPr>
               <a:tblGrid>
-                <a:gridCol w="6532762"/>
-                <a:gridCol w="1875743"/>
+                <a:gridCol w="6532762">
+                  <a:extLst>
+                    <a:ext uri="{9D8B030D-6E8A-4147-A177-3AD203B41FA5}">
+                      <a16:colId xmlns:a16="http://schemas.microsoft.com/office/drawing/2014/main" val="20000"/>
+                    </a:ext>
+                  </a:extLst>
+                </a:gridCol>
+                <a:gridCol w="1875743">
+                  <a:extLst>
+                    <a:ext uri="{9D8B030D-6E8A-4147-A177-3AD203B41FA5}">
+                      <a16:colId xmlns:a16="http://schemas.microsoft.com/office/drawing/2014/main" val="20001"/>
+                    </a:ext>
+                  </a:extLst>
+                </a:gridCol>
               </a:tblGrid>
               <a:tr h="411231">
                 <a:tc>
@@ -7475,7 +7545,7 @@
                     <a:p>
                       <a:pPr algn="l" fontAlgn="b"/>
                       <a:r>
-                        <a:rPr lang="de-DE" sz="1100" u="none" strike="noStrike">
+                        <a:rPr lang="de-DE" sz="1200" u="none" strike="noStrike" dirty="0">
                           <a:solidFill>
                             <a:schemeClr val="accent4">
                               <a:lumMod val="75000"/>
@@ -7485,7 +7555,7 @@
                         </a:rPr>
                         <a:t>Ticketverkauf, clientseitig</a:t>
                       </a:r>
-                      <a:endParaRPr lang="de-DE" sz="1100" b="0" i="0" u="none" strike="noStrike">
+                      <a:endParaRPr lang="de-DE" sz="1200" b="0" i="0" u="none" strike="noStrike" dirty="0">
                         <a:solidFill>
                           <a:schemeClr val="accent4">
                             <a:lumMod val="75000"/>
@@ -7505,7 +7575,7 @@
                     <a:p>
                       <a:pPr algn="ctr" fontAlgn="ctr"/>
                       <a:r>
-                        <a:rPr lang="de-DE" sz="1100" u="none" strike="noStrike">
+                        <a:rPr lang="de-DE" sz="1200" u="none" strike="noStrike">
                           <a:solidFill>
                             <a:schemeClr val="accent4">
                               <a:lumMod val="75000"/>
@@ -7515,7 +7585,7 @@
                         </a:rPr>
                         <a:t>3</a:t>
                       </a:r>
-                      <a:endParaRPr lang="de-DE" sz="1100" b="0" i="0" u="none" strike="noStrike">
+                      <a:endParaRPr lang="de-DE" sz="1200" b="0" i="0" u="none" strike="noStrike">
                         <a:solidFill>
                           <a:schemeClr val="accent4">
                             <a:lumMod val="75000"/>
@@ -7528,6 +7598,11 @@
                   </a:txBody>
                   <a:tcPr marL="6350" marR="6350" marT="6350" marB="0" anchor="ctr"/>
                 </a:tc>
+                <a:extLst>
+                  <a:ext uri="{0D108BD9-81ED-4DB2-BD59-A6C34878D82A}">
+                    <a16:rowId xmlns:a16="http://schemas.microsoft.com/office/drawing/2014/main" val="10000"/>
+                  </a:ext>
+                </a:extLst>
               </a:tr>
               <a:tr h="411231">
                 <a:tc>
@@ -7537,7 +7612,7 @@
                     <a:p>
                       <a:pPr algn="l" fontAlgn="b"/>
                       <a:r>
-                        <a:rPr lang="de-DE" sz="1100" u="none" strike="noStrike">
+                        <a:rPr lang="de-DE" sz="1200" u="none" strike="noStrike">
                           <a:solidFill>
                             <a:schemeClr val="accent4">
                               <a:lumMod val="75000"/>
@@ -7547,7 +7622,7 @@
                         </a:rPr>
                         <a:t>Ticketreservierungen, clientseitig</a:t>
                       </a:r>
-                      <a:endParaRPr lang="de-DE" sz="1100" b="0" i="0" u="none" strike="noStrike">
+                      <a:endParaRPr lang="de-DE" sz="1200" b="0" i="0" u="none" strike="noStrike">
                         <a:solidFill>
                           <a:schemeClr val="accent4">
                             <a:lumMod val="75000"/>
@@ -7567,7 +7642,7 @@
                     <a:p>
                       <a:pPr algn="ctr" fontAlgn="ctr"/>
                       <a:r>
-                        <a:rPr lang="de-DE" sz="1100" u="none" strike="noStrike">
+                        <a:rPr lang="de-DE" sz="1200" u="none" strike="noStrike">
                           <a:solidFill>
                             <a:schemeClr val="accent4">
                               <a:lumMod val="75000"/>
@@ -7577,7 +7652,7 @@
                         </a:rPr>
                         <a:t>3</a:t>
                       </a:r>
-                      <a:endParaRPr lang="de-DE" sz="1100" b="0" i="0" u="none" strike="noStrike">
+                      <a:endParaRPr lang="de-DE" sz="1200" b="0" i="0" u="none" strike="noStrike">
                         <a:solidFill>
                           <a:schemeClr val="accent4">
                             <a:lumMod val="75000"/>
@@ -7590,6 +7665,11 @@
                   </a:txBody>
                   <a:tcPr marL="6350" marR="6350" marT="6350" marB="0" anchor="ctr"/>
                 </a:tc>
+                <a:extLst>
+                  <a:ext uri="{0D108BD9-81ED-4DB2-BD59-A6C34878D82A}">
+                    <a16:rowId xmlns:a16="http://schemas.microsoft.com/office/drawing/2014/main" val="10001"/>
+                  </a:ext>
+                </a:extLst>
               </a:tr>
               <a:tr h="411231">
                 <a:tc>
@@ -7599,7 +7679,7 @@
                     <a:p>
                       <a:pPr algn="l" fontAlgn="b"/>
                       <a:r>
-                        <a:rPr lang="de-DE" sz="1100" u="none" strike="noStrike">
+                        <a:rPr lang="de-DE" sz="1200" u="none" strike="noStrike">
                           <a:solidFill>
                             <a:schemeClr val="accent4">
                               <a:lumMod val="75000"/>
@@ -7609,7 +7689,7 @@
                         </a:rPr>
                         <a:t>Ticketverkauf reservierter Tickets</a:t>
                       </a:r>
-                      <a:endParaRPr lang="de-DE" sz="1100" b="0" i="0" u="none" strike="noStrike">
+                      <a:endParaRPr lang="de-DE" sz="1200" b="0" i="0" u="none" strike="noStrike">
                         <a:solidFill>
                           <a:schemeClr val="accent4">
                             <a:lumMod val="75000"/>
@@ -7629,7 +7709,7 @@
                     <a:p>
                       <a:pPr algn="ctr" fontAlgn="ctr"/>
                       <a:r>
-                        <a:rPr lang="de-DE" sz="1100" u="none" strike="noStrike">
+                        <a:rPr lang="de-DE" sz="1200" u="none" strike="noStrike" dirty="0" smtClean="0">
                           <a:solidFill>
                             <a:schemeClr val="accent4">
                               <a:lumMod val="75000"/>
@@ -7639,7 +7719,7 @@
                         </a:rPr>
                         <a:t>4</a:t>
                       </a:r>
-                      <a:endParaRPr lang="de-DE" sz="1100" b="0" i="0" u="none" strike="noStrike">
+                      <a:endParaRPr lang="de-DE" sz="1200" b="0" i="0" u="none" strike="noStrike" dirty="0">
                         <a:solidFill>
                           <a:schemeClr val="accent4">
                             <a:lumMod val="75000"/>
@@ -7652,6 +7732,11 @@
                   </a:txBody>
                   <a:tcPr marL="6350" marR="6350" marT="6350" marB="0" anchor="ctr"/>
                 </a:tc>
+                <a:extLst>
+                  <a:ext uri="{0D108BD9-81ED-4DB2-BD59-A6C34878D82A}">
+                    <a16:rowId xmlns:a16="http://schemas.microsoft.com/office/drawing/2014/main" val="10002"/>
+                  </a:ext>
+                </a:extLst>
               </a:tr>
               <a:tr h="411231">
                 <a:tc>
@@ -7661,7 +7746,7 @@
                     <a:p>
                       <a:pPr algn="l" fontAlgn="b"/>
                       <a:r>
-                        <a:rPr lang="de-DE" sz="1100" u="none" strike="noStrike">
+                        <a:rPr lang="de-DE" sz="1200" u="none" strike="noStrike">
                           <a:solidFill>
                             <a:schemeClr val="accent4">
                               <a:lumMod val="75000"/>
@@ -7671,7 +7756,7 @@
                         </a:rPr>
                         <a:t>Saalplan Sitzplätze</a:t>
                       </a:r>
-                      <a:endParaRPr lang="de-DE" sz="1100" b="0" i="0" u="none" strike="noStrike">
+                      <a:endParaRPr lang="de-DE" sz="1200" b="0" i="0" u="none" strike="noStrike">
                         <a:solidFill>
                           <a:schemeClr val="accent4">
                             <a:lumMod val="75000"/>
@@ -7691,7 +7776,7 @@
                     <a:p>
                       <a:pPr algn="ctr" fontAlgn="ctr"/>
                       <a:r>
-                        <a:rPr lang="de-DE" sz="1100" u="none" strike="noStrike">
+                        <a:rPr lang="de-DE" sz="1200" u="none" strike="noStrike">
                           <a:solidFill>
                             <a:schemeClr val="accent4">
                               <a:lumMod val="75000"/>
@@ -7701,7 +7786,7 @@
                         </a:rPr>
                         <a:t>10</a:t>
                       </a:r>
-                      <a:endParaRPr lang="de-DE" sz="1100" b="0" i="0" u="none" strike="noStrike">
+                      <a:endParaRPr lang="de-DE" sz="1200" b="0" i="0" u="none" strike="noStrike">
                         <a:solidFill>
                           <a:schemeClr val="accent4">
                             <a:lumMod val="75000"/>
@@ -7714,6 +7799,11 @@
                   </a:txBody>
                   <a:tcPr marL="6350" marR="6350" marT="6350" marB="0" anchor="ctr"/>
                 </a:tc>
+                <a:extLst>
+                  <a:ext uri="{0D108BD9-81ED-4DB2-BD59-A6C34878D82A}">
+                    <a16:rowId xmlns:a16="http://schemas.microsoft.com/office/drawing/2014/main" val="10003"/>
+                  </a:ext>
+                </a:extLst>
               </a:tr>
               <a:tr h="411231">
                 <a:tc>
@@ -7723,7 +7813,7 @@
                     <a:p>
                       <a:pPr algn="l" fontAlgn="b"/>
                       <a:r>
-                        <a:rPr lang="de-DE" sz="1100" u="none" strike="noStrike" dirty="0">
+                        <a:rPr lang="de-DE" sz="1200" u="none" strike="noStrike" dirty="0">
                           <a:solidFill>
                             <a:schemeClr val="accent4">
                               <a:lumMod val="75000"/>
@@ -7734,7 +7824,7 @@
                         <a:t>Verkauf von ausgewählten </a:t>
                       </a:r>
                       <a:r>
-                        <a:rPr lang="de-DE" sz="1100" u="none" strike="noStrike" dirty="0" err="1">
+                        <a:rPr lang="de-DE" sz="1200" u="none" strike="noStrike" dirty="0" err="1">
                           <a:solidFill>
                             <a:schemeClr val="accent4">
                               <a:lumMod val="75000"/>
@@ -7744,7 +7834,7 @@
                         </a:rPr>
                         <a:t>Ticktes</a:t>
                       </a:r>
-                      <a:endParaRPr lang="de-DE" sz="1100" b="0" i="0" u="none" strike="noStrike" dirty="0">
+                      <a:endParaRPr lang="de-DE" sz="1200" b="0" i="0" u="none" strike="noStrike" dirty="0">
                         <a:solidFill>
                           <a:schemeClr val="accent4">
                             <a:lumMod val="75000"/>
@@ -7764,7 +7854,7 @@
                     <a:p>
                       <a:pPr algn="ctr" fontAlgn="b"/>
                       <a:r>
-                        <a:rPr lang="de-DE" sz="1100" u="none" strike="noStrike">
+                        <a:rPr lang="de-DE" sz="1200" u="none" strike="noStrike">
                           <a:solidFill>
                             <a:schemeClr val="accent4">
                               <a:lumMod val="75000"/>
@@ -7774,7 +7864,7 @@
                         </a:rPr>
                         <a:t>3</a:t>
                       </a:r>
-                      <a:endParaRPr lang="de-DE" sz="1100" b="0" i="0" u="none" strike="noStrike">
+                      <a:endParaRPr lang="de-DE" sz="1200" b="0" i="0" u="none" strike="noStrike">
                         <a:solidFill>
                           <a:schemeClr val="accent4">
                             <a:lumMod val="75000"/>
@@ -7787,6 +7877,11 @@
                   </a:txBody>
                   <a:tcPr marL="6350" marR="6350" marT="6350" marB="0" anchor="b"/>
                 </a:tc>
+                <a:extLst>
+                  <a:ext uri="{0D108BD9-81ED-4DB2-BD59-A6C34878D82A}">
+                    <a16:rowId xmlns:a16="http://schemas.microsoft.com/office/drawing/2014/main" val="10004"/>
+                  </a:ext>
+                </a:extLst>
               </a:tr>
               <a:tr h="411231">
                 <a:tc>
@@ -7796,7 +7891,7 @@
                     <a:p>
                       <a:pPr algn="l" fontAlgn="b"/>
                       <a:r>
-                        <a:rPr lang="de-DE" sz="1100" u="none" strike="noStrike" dirty="0">
+                        <a:rPr lang="de-DE" sz="1200" u="none" strike="noStrike" dirty="0">
                           <a:solidFill>
                             <a:schemeClr val="accent4">
                               <a:lumMod val="75000"/>
@@ -7806,7 +7901,7 @@
                         </a:rPr>
                         <a:t>Stornierung von verkauften Tickets</a:t>
                       </a:r>
-                      <a:endParaRPr lang="de-DE" sz="1100" b="0" i="0" u="none" strike="noStrike" dirty="0">
+                      <a:endParaRPr lang="de-DE" sz="1200" b="0" i="0" u="none" strike="noStrike" dirty="0">
                         <a:solidFill>
                           <a:schemeClr val="accent4">
                             <a:lumMod val="75000"/>
@@ -7826,7 +7921,7 @@
                     <a:p>
                       <a:pPr algn="ctr" fontAlgn="ctr"/>
                       <a:r>
-                        <a:rPr lang="de-DE" sz="1100" u="none" strike="noStrike">
+                        <a:rPr lang="de-DE" sz="1200" u="none" strike="noStrike">
                           <a:solidFill>
                             <a:schemeClr val="accent4">
                               <a:lumMod val="75000"/>
@@ -7836,7 +7931,7 @@
                         </a:rPr>
                         <a:t>6</a:t>
                       </a:r>
-                      <a:endParaRPr lang="de-DE" sz="1100" b="0" i="0" u="none" strike="noStrike">
+                      <a:endParaRPr lang="de-DE" sz="1200" b="0" i="0" u="none" strike="noStrike">
                         <a:solidFill>
                           <a:schemeClr val="accent4">
                             <a:lumMod val="75000"/>
@@ -7849,6 +7944,11 @@
                   </a:txBody>
                   <a:tcPr marL="6350" marR="6350" marT="6350" marB="0" anchor="ctr"/>
                 </a:tc>
+                <a:extLst>
+                  <a:ext uri="{0D108BD9-81ED-4DB2-BD59-A6C34878D82A}">
+                    <a16:rowId xmlns:a16="http://schemas.microsoft.com/office/drawing/2014/main" val="10005"/>
+                  </a:ext>
+                </a:extLst>
               </a:tr>
               <a:tr h="411231">
                 <a:tc>
@@ -7858,7 +7958,7 @@
                     <a:p>
                       <a:pPr algn="l" fontAlgn="b"/>
                       <a:r>
-                        <a:rPr lang="de-DE" sz="1100" u="none" strike="noStrike" dirty="0">
+                        <a:rPr lang="de-DE" sz="1200" u="none" strike="noStrike" dirty="0">
                           <a:solidFill>
                             <a:schemeClr val="accent4">
                               <a:lumMod val="75000"/>
@@ -7868,7 +7968,7 @@
                         </a:rPr>
                         <a:t>Stornierung von Ticketreservierungen</a:t>
                       </a:r>
-                      <a:endParaRPr lang="de-DE" sz="1100" b="0" i="0" u="none" strike="noStrike" dirty="0">
+                      <a:endParaRPr lang="de-DE" sz="1200" b="0" i="0" u="none" strike="noStrike" dirty="0">
                         <a:solidFill>
                           <a:schemeClr val="accent4">
                             <a:lumMod val="75000"/>
@@ -7888,7 +7988,7 @@
                     <a:p>
                       <a:pPr algn="ctr" fontAlgn="ctr"/>
                       <a:r>
-                        <a:rPr lang="de-DE" sz="1100" u="none" strike="noStrike" dirty="0">
+                        <a:rPr lang="de-DE" sz="1200" u="none" strike="noStrike" dirty="0">
                           <a:solidFill>
                             <a:schemeClr val="accent4">
                               <a:lumMod val="75000"/>
@@ -7898,7 +7998,7 @@
                         </a:rPr>
                         <a:t>3</a:t>
                       </a:r>
-                      <a:endParaRPr lang="de-DE" sz="1100" b="0" i="0" u="none" strike="noStrike" dirty="0">
+                      <a:endParaRPr lang="de-DE" sz="1200" b="0" i="0" u="none" strike="noStrike" dirty="0">
                         <a:solidFill>
                           <a:schemeClr val="accent4">
                             <a:lumMod val="75000"/>
@@ -7911,6 +8011,11 @@
                   </a:txBody>
                   <a:tcPr marL="6350" marR="6350" marT="6350" marB="0" anchor="ctr"/>
                 </a:tc>
+                <a:extLst>
+                  <a:ext uri="{0D108BD9-81ED-4DB2-BD59-A6C34878D82A}">
+                    <a16:rowId xmlns:a16="http://schemas.microsoft.com/office/drawing/2014/main" val="10006"/>
+                  </a:ext>
+                </a:extLst>
               </a:tr>
               <a:tr h="411231">
                 <a:tc>
@@ -7920,7 +8025,7 @@
                     <a:p>
                       <a:pPr algn="l" fontAlgn="b"/>
                       <a:r>
-                        <a:rPr lang="de-DE" sz="1100" u="none" strike="noStrike" dirty="0">
+                        <a:rPr lang="de-DE" sz="1200" u="none" strike="noStrike" dirty="0">
                           <a:solidFill>
                             <a:srgbClr val="FF0000"/>
                           </a:solidFill>
@@ -7928,7 +8033,7 @@
                         </a:rPr>
                         <a:t>PDF Druck von Rechnungen</a:t>
                       </a:r>
-                      <a:endParaRPr lang="de-DE" sz="1100" b="0" i="0" u="none" strike="noStrike" dirty="0">
+                      <a:endParaRPr lang="de-DE" sz="1200" b="0" i="0" u="none" strike="noStrike" dirty="0">
                         <a:solidFill>
                           <a:srgbClr val="FF0000"/>
                         </a:solidFill>
@@ -7946,7 +8051,7 @@
                     <a:p>
                       <a:pPr algn="ctr" fontAlgn="ctr"/>
                       <a:r>
-                        <a:rPr lang="de-DE" sz="1100" u="none" strike="noStrike" dirty="0">
+                        <a:rPr lang="de-DE" sz="1200" u="none" strike="noStrike" dirty="0">
                           <a:solidFill>
                             <a:srgbClr val="FF0000"/>
                           </a:solidFill>
@@ -7954,7 +8059,7 @@
                         </a:rPr>
                         <a:t>8</a:t>
                       </a:r>
-                      <a:endParaRPr lang="de-DE" sz="1100" b="0" i="0" u="none" strike="noStrike" dirty="0">
+                      <a:endParaRPr lang="de-DE" sz="1200" b="0" i="0" u="none" strike="noStrike" dirty="0">
                         <a:solidFill>
                           <a:srgbClr val="FF0000"/>
                         </a:solidFill>
@@ -7965,6 +8070,11 @@
                   </a:txBody>
                   <a:tcPr marL="6350" marR="6350" marT="6350" marB="0" anchor="ctr"/>
                 </a:tc>
+                <a:extLst>
+                  <a:ext uri="{0D108BD9-81ED-4DB2-BD59-A6C34878D82A}">
+                    <a16:rowId xmlns:a16="http://schemas.microsoft.com/office/drawing/2014/main" val="10007"/>
+                  </a:ext>
+                </a:extLst>
               </a:tr>
             </a:tbl>
           </a:graphicData>
@@ -8085,7 +8195,15 @@
             </a:r>
             <a:r>
               <a:rPr lang="de-AT" dirty="0" smtClean="0"/>
-              <a:t> 40 </a:t>
+              <a:t> </a:t>
+            </a:r>
+            <a:r>
+              <a:rPr lang="de-AT" dirty="0" smtClean="0"/>
+              <a:t>38</a:t>
+            </a:r>
+            <a:r>
+              <a:rPr lang="de-AT" dirty="0" smtClean="0"/>
+              <a:t> </a:t>
             </a:r>
             <a:r>
               <a:rPr lang="de-AT" dirty="0" err="1" smtClean="0"/>
@@ -8119,14 +8237,14 @@
             <p:ph idx="1"/>
             <p:extLst>
               <p:ext uri="{D42A27DB-BD31-4B8C-83A1-F6EECF244321}">
-                <p14:modId xmlns:p14="http://schemas.microsoft.com/office/powerpoint/2010/main" val="143907819"/>
+                <p14:modId xmlns:p14="http://schemas.microsoft.com/office/powerpoint/2010/main" val="988940006"/>
               </p:ext>
             </p:extLst>
           </p:nvPr>
         </p:nvGraphicFramePr>
         <p:xfrm>
           <a:off x="646111" y="1853246"/>
-          <a:ext cx="9404723" cy="3593396"/>
+          <a:ext cx="9404723" cy="4138477"/>
         </p:xfrm>
         <a:graphic>
           <a:graphicData uri="http://schemas.openxmlformats.org/drawingml/2006/table">
@@ -8135,10 +8253,22 @@
                 <a:tableStyleId>{5C22544A-7EE6-4342-B048-85BDC9FD1C3A}</a:tableStyleId>
               </a:tblPr>
               <a:tblGrid>
-                <a:gridCol w="7306747"/>
-                <a:gridCol w="2097976"/>
+                <a:gridCol w="7306747">
+                  <a:extLst>
+                    <a:ext uri="{9D8B030D-6E8A-4147-A177-3AD203B41FA5}">
+                      <a16:colId xmlns:a16="http://schemas.microsoft.com/office/drawing/2014/main" val="20000"/>
+                    </a:ext>
+                  </a:extLst>
+                </a:gridCol>
+                <a:gridCol w="2097976">
+                  <a:extLst>
+                    <a:ext uri="{9D8B030D-6E8A-4147-A177-3AD203B41FA5}">
+                      <a16:colId xmlns:a16="http://schemas.microsoft.com/office/drawing/2014/main" val="20001"/>
+                    </a:ext>
+                  </a:extLst>
+                </a:gridCol>
               </a:tblGrid>
-              <a:tr h="244893">
+              <a:tr h="320249">
                 <a:tc>
                   <a:txBody>
                     <a:bodyPr/>
@@ -8146,12 +8276,12 @@
                     <a:p>
                       <a:pPr algn="l" fontAlgn="b"/>
                       <a:r>
-                        <a:rPr lang="de-DE" sz="1100" u="none" strike="noStrike">
+                        <a:rPr lang="de-DE" sz="1200" u="none" strike="noStrike" dirty="0">
                           <a:effectLst/>
                         </a:rPr>
                         <a:t>PDF Druck von Rechnungen</a:t>
                       </a:r>
-                      <a:endParaRPr lang="de-DE" sz="1100" b="0" i="0" u="none" strike="noStrike">
+                      <a:endParaRPr lang="de-DE" sz="1200" b="0" i="0" u="none" strike="noStrike" dirty="0">
                         <a:solidFill>
                           <a:srgbClr val="000000"/>
                         </a:solidFill>
@@ -8169,12 +8299,12 @@
                     <a:p>
                       <a:pPr algn="ctr" fontAlgn="ctr"/>
                       <a:r>
-                        <a:rPr lang="de-DE" sz="1100" u="none" strike="noStrike">
+                        <a:rPr lang="de-DE" sz="1200" u="none" strike="noStrike">
                           <a:effectLst/>
                         </a:rPr>
                         <a:t>8</a:t>
                       </a:r>
-                      <a:endParaRPr lang="de-DE" sz="1100" b="0" i="0" u="none" strike="noStrike">
+                      <a:endParaRPr lang="de-DE" sz="1200" b="0" i="0" u="none" strike="noStrike">
                         <a:solidFill>
                           <a:srgbClr val="000000"/>
                         </a:solidFill>
@@ -8185,8 +8315,13 @@
                   </a:txBody>
                   <a:tcPr marL="6350" marR="6350" marT="6350" marB="0" anchor="ctr"/>
                 </a:tc>
+                <a:extLst>
+                  <a:ext uri="{0D108BD9-81ED-4DB2-BD59-A6C34878D82A}">
+                    <a16:rowId xmlns:a16="http://schemas.microsoft.com/office/drawing/2014/main" val="10000"/>
+                  </a:ext>
+                </a:extLst>
               </a:tr>
-              <a:tr h="244893">
+              <a:tr h="320249">
                 <a:tc>
                   <a:txBody>
                     <a:bodyPr/>
@@ -8194,12 +8329,12 @@
                     <a:p>
                       <a:pPr algn="l" fontAlgn="b"/>
                       <a:r>
-                        <a:rPr lang="de-DE" sz="1100" u="none" strike="noStrike">
+                        <a:rPr lang="de-DE" sz="1200" u="none" strike="noStrike">
                           <a:effectLst/>
                         </a:rPr>
                         <a:t>PDF Druck von Stornorechnungen</a:t>
                       </a:r>
-                      <a:endParaRPr lang="de-DE" sz="1100" b="0" i="0" u="none" strike="noStrike">
+                      <a:endParaRPr lang="de-DE" sz="1200" b="0" i="0" u="none" strike="noStrike">
                         <a:solidFill>
                           <a:srgbClr val="000000"/>
                         </a:solidFill>
@@ -8217,12 +8352,12 @@
                     <a:p>
                       <a:pPr algn="ctr" fontAlgn="ctr"/>
                       <a:r>
-                        <a:rPr lang="de-DE" sz="1100" u="none" strike="noStrike">
+                        <a:rPr lang="de-DE" sz="1200" u="none" strike="noStrike">
                           <a:effectLst/>
                         </a:rPr>
                         <a:t>4</a:t>
                       </a:r>
-                      <a:endParaRPr lang="de-DE" sz="1100" b="0" i="0" u="none" strike="noStrike">
+                      <a:endParaRPr lang="de-DE" sz="1200" b="0" i="0" u="none" strike="noStrike">
                         <a:solidFill>
                           <a:srgbClr val="000000"/>
                         </a:solidFill>
@@ -8233,8 +8368,13 @@
                   </a:txBody>
                   <a:tcPr marL="6350" marR="6350" marT="6350" marB="0" anchor="ctr"/>
                 </a:tc>
+                <a:extLst>
+                  <a:ext uri="{0D108BD9-81ED-4DB2-BD59-A6C34878D82A}">
+                    <a16:rowId xmlns:a16="http://schemas.microsoft.com/office/drawing/2014/main" val="10001"/>
+                  </a:ext>
+                </a:extLst>
               </a:tr>
-              <a:tr h="244893">
+              <a:tr h="320249">
                 <a:tc>
                   <a:txBody>
                     <a:bodyPr/>
@@ -8242,12 +8382,12 @@
                     <a:p>
                       <a:pPr algn="l" fontAlgn="b"/>
                       <a:r>
-                        <a:rPr lang="de-DE" sz="1100" u="none" strike="noStrike">
+                        <a:rPr lang="de-DE" sz="1200" u="none" strike="noStrike">
                           <a:effectLst/>
                         </a:rPr>
                         <a:t>Veranstaltungsarten</a:t>
                       </a:r>
-                      <a:endParaRPr lang="de-DE" sz="1100" b="0" i="0" u="none" strike="noStrike">
+                      <a:endParaRPr lang="de-DE" sz="1200" b="0" i="0" u="none" strike="noStrike">
                         <a:solidFill>
                           <a:srgbClr val="000000"/>
                         </a:solidFill>
@@ -8265,12 +8405,12 @@
                     <a:p>
                       <a:pPr algn="ctr" fontAlgn="ctr"/>
                       <a:r>
-                        <a:rPr lang="de-DE" sz="1100" u="none" strike="noStrike">
+                        <a:rPr lang="de-DE" sz="1200" u="none" strike="noStrike">
                           <a:effectLst/>
                         </a:rPr>
                         <a:t>5</a:t>
                       </a:r>
-                      <a:endParaRPr lang="de-DE" sz="1100" b="0" i="0" u="none" strike="noStrike">
+                      <a:endParaRPr lang="de-DE" sz="1200" b="0" i="0" u="none" strike="noStrike">
                         <a:solidFill>
                           <a:srgbClr val="000000"/>
                         </a:solidFill>
@@ -8281,8 +8421,13 @@
                   </a:txBody>
                   <a:tcPr marL="6350" marR="6350" marT="6350" marB="0" anchor="ctr"/>
                 </a:tc>
+                <a:extLst>
+                  <a:ext uri="{0D108BD9-81ED-4DB2-BD59-A6C34878D82A}">
+                    <a16:rowId xmlns:a16="http://schemas.microsoft.com/office/drawing/2014/main" val="10002"/>
+                  </a:ext>
+                </a:extLst>
               </a:tr>
-              <a:tr h="244893">
+              <a:tr h="320249">
                 <a:tc>
                   <a:txBody>
                     <a:bodyPr/>
@@ -8290,12 +8435,12 @@
                     <a:p>
                       <a:pPr algn="l" fontAlgn="b"/>
                       <a:r>
-                        <a:rPr lang="de-DE" sz="1100" u="none" strike="noStrike">
+                        <a:rPr lang="de-DE" sz="1200" u="none" strike="noStrike">
                           <a:effectLst/>
                         </a:rPr>
                         <a:t>Suchen/Filtern nach Zeit</a:t>
                       </a:r>
-                      <a:endParaRPr lang="de-DE" sz="1100" b="0" i="0" u="none" strike="noStrike">
+                      <a:endParaRPr lang="de-DE" sz="1200" b="0" i="0" u="none" strike="noStrike">
                         <a:solidFill>
                           <a:srgbClr val="000000"/>
                         </a:solidFill>
@@ -8313,12 +8458,12 @@
                     <a:p>
                       <a:pPr algn="ctr" fontAlgn="ctr"/>
                       <a:r>
-                        <a:rPr lang="de-DE" sz="1100" u="none" strike="noStrike">
+                        <a:rPr lang="de-DE" sz="1200" u="none" strike="noStrike">
                           <a:effectLst/>
                         </a:rPr>
                         <a:t>1</a:t>
                       </a:r>
-                      <a:endParaRPr lang="de-DE" sz="1100" b="0" i="0" u="none" strike="noStrike">
+                      <a:endParaRPr lang="de-DE" sz="1200" b="0" i="0" u="none" strike="noStrike">
                         <a:solidFill>
                           <a:srgbClr val="000000"/>
                         </a:solidFill>
@@ -8329,8 +8474,13 @@
                   </a:txBody>
                   <a:tcPr marL="6350" marR="6350" marT="6350" marB="0" anchor="ctr"/>
                 </a:tc>
+                <a:extLst>
+                  <a:ext uri="{0D108BD9-81ED-4DB2-BD59-A6C34878D82A}">
+                    <a16:rowId xmlns:a16="http://schemas.microsoft.com/office/drawing/2014/main" val="10003"/>
+                  </a:ext>
+                </a:extLst>
               </a:tr>
-              <a:tr h="244893">
+              <a:tr h="320249">
                 <a:tc>
                   <a:txBody>
                     <a:bodyPr/>
@@ -8338,12 +8488,12 @@
                     <a:p>
                       <a:pPr algn="l" fontAlgn="b"/>
                       <a:r>
-                        <a:rPr lang="de-DE" sz="1100" u="none" strike="noStrike">
+                        <a:rPr lang="de-DE" sz="1200" u="none" strike="noStrike">
                           <a:effectLst/>
                         </a:rPr>
                         <a:t>Suchen/Filtern nach Orten</a:t>
                       </a:r>
-                      <a:endParaRPr lang="de-DE" sz="1100" b="0" i="0" u="none" strike="noStrike">
+                      <a:endParaRPr lang="de-DE" sz="1200" b="0" i="0" u="none" strike="noStrike">
                         <a:solidFill>
                           <a:srgbClr val="000000"/>
                         </a:solidFill>
@@ -8361,12 +8511,12 @@
                     <a:p>
                       <a:pPr algn="ctr" fontAlgn="ctr"/>
                       <a:r>
-                        <a:rPr lang="de-DE" sz="1100" u="none" strike="noStrike">
+                        <a:rPr lang="de-DE" sz="1200" u="none" strike="noStrike">
                           <a:effectLst/>
                         </a:rPr>
                         <a:t>1</a:t>
                       </a:r>
-                      <a:endParaRPr lang="de-DE" sz="1100" b="0" i="0" u="none" strike="noStrike">
+                      <a:endParaRPr lang="de-DE" sz="1200" b="0" i="0" u="none" strike="noStrike">
                         <a:solidFill>
                           <a:srgbClr val="000000"/>
                         </a:solidFill>
@@ -8377,8 +8527,13 @@
                   </a:txBody>
                   <a:tcPr marL="6350" marR="6350" marT="6350" marB="0" anchor="ctr"/>
                 </a:tc>
+                <a:extLst>
+                  <a:ext uri="{0D108BD9-81ED-4DB2-BD59-A6C34878D82A}">
+                    <a16:rowId xmlns:a16="http://schemas.microsoft.com/office/drawing/2014/main" val="10004"/>
+                  </a:ext>
+                </a:extLst>
               </a:tr>
-              <a:tr h="244893">
+              <a:tr h="320249">
                 <a:tc>
                   <a:txBody>
                     <a:bodyPr/>
@@ -8386,12 +8541,12 @@
                     <a:p>
                       <a:pPr algn="l" fontAlgn="b"/>
                       <a:r>
-                        <a:rPr lang="de-DE" sz="1100" u="none" strike="noStrike">
+                        <a:rPr lang="de-DE" sz="1200" u="none" strike="noStrike">
                           <a:effectLst/>
                         </a:rPr>
                         <a:t>Suchen/Filtern nach Künstlern</a:t>
                       </a:r>
-                      <a:endParaRPr lang="de-DE" sz="1100" b="0" i="0" u="none" strike="noStrike">
+                      <a:endParaRPr lang="de-DE" sz="1200" b="0" i="0" u="none" strike="noStrike">
                         <a:solidFill>
                           <a:srgbClr val="000000"/>
                         </a:solidFill>
@@ -8409,12 +8564,12 @@
                     <a:p>
                       <a:pPr algn="ctr" fontAlgn="ctr"/>
                       <a:r>
-                        <a:rPr lang="de-DE" sz="1100" u="none" strike="noStrike">
+                        <a:rPr lang="de-DE" sz="1200" u="none" strike="noStrike">
                           <a:effectLst/>
                         </a:rPr>
                         <a:t>1</a:t>
                       </a:r>
-                      <a:endParaRPr lang="de-DE" sz="1100" b="0" i="0" u="none" strike="noStrike">
+                      <a:endParaRPr lang="de-DE" sz="1200" b="0" i="0" u="none" strike="noStrike">
                         <a:solidFill>
                           <a:srgbClr val="000000"/>
                         </a:solidFill>
@@ -8425,8 +8580,13 @@
                   </a:txBody>
                   <a:tcPr marL="6350" marR="6350" marT="6350" marB="0" anchor="ctr"/>
                 </a:tc>
+                <a:extLst>
+                  <a:ext uri="{0D108BD9-81ED-4DB2-BD59-A6C34878D82A}">
+                    <a16:rowId xmlns:a16="http://schemas.microsoft.com/office/drawing/2014/main" val="10005"/>
+                  </a:ext>
+                </a:extLst>
               </a:tr>
-              <a:tr h="244893">
+              <a:tr h="320249">
                 <a:tc>
                   <a:txBody>
                     <a:bodyPr/>
@@ -8434,12 +8594,12 @@
                     <a:p>
                       <a:pPr algn="l" fontAlgn="b"/>
                       <a:r>
-                        <a:rPr lang="de-DE" sz="1100" u="none" strike="noStrike">
+                        <a:rPr lang="de-DE" sz="1200" u="none" strike="noStrike">
                           <a:effectLst/>
                         </a:rPr>
                         <a:t>Suchen/Filtern nach Veranstaltungen</a:t>
                       </a:r>
-                      <a:endParaRPr lang="de-DE" sz="1100" b="0" i="0" u="none" strike="noStrike">
+                      <a:endParaRPr lang="de-DE" sz="1200" b="0" i="0" u="none" strike="noStrike">
                         <a:solidFill>
                           <a:srgbClr val="000000"/>
                         </a:solidFill>
@@ -8457,12 +8617,12 @@
                     <a:p>
                       <a:pPr algn="ctr" fontAlgn="ctr"/>
                       <a:r>
-                        <a:rPr lang="de-DE" sz="1100" u="none" strike="noStrike">
+                        <a:rPr lang="de-DE" sz="1200" u="none" strike="noStrike">
                           <a:effectLst/>
                         </a:rPr>
                         <a:t>1</a:t>
                       </a:r>
-                      <a:endParaRPr lang="de-DE" sz="1100" b="0" i="0" u="none" strike="noStrike">
+                      <a:endParaRPr lang="de-DE" sz="1200" b="0" i="0" u="none" strike="noStrike">
                         <a:solidFill>
                           <a:srgbClr val="000000"/>
                         </a:solidFill>
@@ -8473,8 +8633,13 @@
                   </a:txBody>
                   <a:tcPr marL="6350" marR="6350" marT="6350" marB="0" anchor="ctr"/>
                 </a:tc>
+                <a:extLst>
+                  <a:ext uri="{0D108BD9-81ED-4DB2-BD59-A6C34878D82A}">
+                    <a16:rowId xmlns:a16="http://schemas.microsoft.com/office/drawing/2014/main" val="10006"/>
+                  </a:ext>
+                </a:extLst>
               </a:tr>
-              <a:tr h="244893">
+              <a:tr h="320249">
                 <a:tc>
                   <a:txBody>
                     <a:bodyPr/>
@@ -8482,12 +8647,24 @@
                     <a:p>
                       <a:pPr algn="l" fontAlgn="b"/>
                       <a:r>
-                        <a:rPr lang="de-DE" sz="1100" u="none" strike="noStrike">
+                        <a:rPr lang="de-DE" sz="1200" u="none" strike="noStrike" dirty="0">
                           <a:effectLst/>
                         </a:rPr>
-                        <a:t>Top Ten Veranstaltungen</a:t>
+                        <a:t>Top </a:t>
                       </a:r>
-                      <a:endParaRPr lang="de-DE" sz="1100" b="0" i="0" u="none" strike="noStrike">
+                      <a:r>
+                        <a:rPr lang="de-DE" sz="1200" u="none" strike="noStrike" dirty="0" err="1">
+                          <a:effectLst/>
+                        </a:rPr>
+                        <a:t>Ten</a:t>
+                      </a:r>
+                      <a:r>
+                        <a:rPr lang="de-DE" sz="1200" u="none" strike="noStrike" dirty="0">
+                          <a:effectLst/>
+                        </a:rPr>
+                        <a:t> Veranstaltungen</a:t>
+                      </a:r>
+                      <a:endParaRPr lang="de-DE" sz="1200" b="0" i="0" u="none" strike="noStrike" dirty="0">
                         <a:solidFill>
                           <a:srgbClr val="000000"/>
                         </a:solidFill>
@@ -8505,12 +8682,12 @@
                     <a:p>
                       <a:pPr algn="ctr" fontAlgn="ctr"/>
                       <a:r>
-                        <a:rPr lang="de-DE" sz="1100" u="none" strike="noStrike">
+                        <a:rPr lang="de-DE" sz="1200" u="none" strike="noStrike">
                           <a:effectLst/>
                         </a:rPr>
                         <a:t>6</a:t>
                       </a:r>
-                      <a:endParaRPr lang="de-DE" sz="1100" b="0" i="0" u="none" strike="noStrike">
+                      <a:endParaRPr lang="de-DE" sz="1200" b="0" i="0" u="none" strike="noStrike">
                         <a:solidFill>
                           <a:srgbClr val="000000"/>
                         </a:solidFill>
@@ -8521,8 +8698,13 @@
                   </a:txBody>
                   <a:tcPr marL="6350" marR="6350" marT="6350" marB="0" anchor="ctr"/>
                 </a:tc>
+                <a:extLst>
+                  <a:ext uri="{0D108BD9-81ED-4DB2-BD59-A6C34878D82A}">
+                    <a16:rowId xmlns:a16="http://schemas.microsoft.com/office/drawing/2014/main" val="10007"/>
+                  </a:ext>
+                </a:extLst>
               </a:tr>
-              <a:tr h="244893">
+              <a:tr h="615738">
                 <a:tc>
                   <a:txBody>
                     <a:bodyPr/>
@@ -8530,12 +8712,23 @@
                     <a:p>
                       <a:pPr algn="l" fontAlgn="b"/>
                       <a:r>
-                        <a:rPr lang="de-DE" sz="1100" u="none" strike="noStrike">
+                        <a:rPr lang="de-DE" sz="1200" u="none" strike="noStrike" dirty="0">
                           <a:effectLst/>
                         </a:rPr>
-                        <a:t>Mehrsprachigkeit - laufend</a:t>
+                        <a:t>Übersicht alles Rechnungen/Reservierungen</a:t>
                       </a:r>
-                      <a:endParaRPr lang="de-DE" sz="1100" b="0" i="0" u="none" strike="noStrike">
+                      <a:br>
+                        <a:rPr lang="de-DE" sz="1200" u="none" strike="noStrike" dirty="0">
+                          <a:effectLst/>
+                        </a:rPr>
+                      </a:br>
+                      <a:r>
+                        <a:rPr lang="de-DE" sz="1200" u="none" strike="noStrike" dirty="0">
+                          <a:effectLst/>
+                        </a:rPr>
+                        <a:t>Stornierungen und PDF neu drucken</a:t>
+                      </a:r>
+                      <a:endParaRPr lang="de-DE" sz="1200" b="0" i="0" u="none" strike="noStrike" dirty="0">
                         <a:solidFill>
                           <a:srgbClr val="000000"/>
                         </a:solidFill>
@@ -8553,12 +8746,16 @@
                     <a:p>
                       <a:pPr algn="ctr" fontAlgn="ctr"/>
                       <a:r>
-                        <a:rPr lang="de-DE" sz="1100" u="none" strike="noStrike">
+                        <a:rPr lang="de-DE" sz="1200" b="0" i="0" u="none" strike="noStrike" dirty="0">
+                          <a:solidFill>
+                            <a:schemeClr val="dk1"/>
+                          </a:solidFill>
                           <a:effectLst/>
+                          <a:latin typeface="+mn-lt"/>
                         </a:rPr>
-                        <a:t>5</a:t>
+                        <a:t>3</a:t>
                       </a:r>
-                      <a:endParaRPr lang="de-DE" sz="1100" b="0" i="0" u="none" strike="noStrike">
+                      <a:endParaRPr lang="de-DE" sz="1200" b="0" i="0" u="none" strike="noStrike" dirty="0">
                         <a:solidFill>
                           <a:srgbClr val="000000"/>
                         </a:solidFill>
@@ -8569,8 +8766,13 @@
                   </a:txBody>
                   <a:tcPr marL="6350" marR="6350" marT="6350" marB="0" anchor="ctr"/>
                 </a:tc>
+                <a:extLst>
+                  <a:ext uri="{0D108BD9-81ED-4DB2-BD59-A6C34878D82A}">
+                    <a16:rowId xmlns:a16="http://schemas.microsoft.com/office/drawing/2014/main" val="10009"/>
+                  </a:ext>
+                </a:extLst>
               </a:tr>
-              <a:tr h="654680">
+              <a:tr h="320249">
                 <a:tc>
                   <a:txBody>
                     <a:bodyPr/>
@@ -8578,23 +8780,12 @@
                     <a:p>
                       <a:pPr algn="l" fontAlgn="b"/>
                       <a:r>
-                        <a:rPr lang="de-DE" sz="1100" u="none" strike="noStrike">
+                        <a:rPr lang="de-DE" sz="1200" u="none" strike="noStrike">
                           <a:effectLst/>
                         </a:rPr>
-                        <a:t>Übersicht alles Rechnungen/Reservierungen</a:t>
+                        <a:t>News erstellen</a:t>
                       </a:r>
-                      <a:br>
-                        <a:rPr lang="de-DE" sz="1100" u="none" strike="noStrike">
-                          <a:effectLst/>
-                        </a:rPr>
-                      </a:br>
-                      <a:r>
-                        <a:rPr lang="de-DE" sz="1100" u="none" strike="noStrike">
-                          <a:effectLst/>
-                        </a:rPr>
-                        <a:t>Stornierungen und PDF neu drucken</a:t>
-                      </a:r>
-                      <a:endParaRPr lang="de-DE" sz="1100" b="0" i="0" u="none" strike="noStrike">
+                      <a:endParaRPr lang="de-DE" sz="1200" b="0" i="0" u="none" strike="noStrike">
                         <a:solidFill>
                           <a:srgbClr val="000000"/>
                         </a:solidFill>
@@ -8612,12 +8803,12 @@
                     <a:p>
                       <a:pPr algn="ctr" fontAlgn="ctr"/>
                       <a:r>
-                        <a:rPr lang="de-DE" sz="1100" u="none" strike="noStrike">
+                        <a:rPr lang="de-DE" sz="1200" u="none" strike="noStrike">
                           <a:effectLst/>
                         </a:rPr>
-                        <a:t>4</a:t>
+                        <a:t>3</a:t>
                       </a:r>
-                      <a:endParaRPr lang="de-DE" sz="1100" b="0" i="0" u="none" strike="noStrike">
+                      <a:endParaRPr lang="de-DE" sz="1200" b="0" i="0" u="none" strike="noStrike">
                         <a:solidFill>
                           <a:srgbClr val="000000"/>
                         </a:solidFill>
@@ -8628,8 +8819,13 @@
                   </a:txBody>
                   <a:tcPr marL="6350" marR="6350" marT="6350" marB="0" anchor="ctr"/>
                 </a:tc>
+                <a:extLst>
+                  <a:ext uri="{0D108BD9-81ED-4DB2-BD59-A6C34878D82A}">
+                    <a16:rowId xmlns:a16="http://schemas.microsoft.com/office/drawing/2014/main" val="10010"/>
+                  </a:ext>
+                </a:extLst>
               </a:tr>
-              <a:tr h="244893">
+              <a:tr h="320249">
                 <a:tc>
                   <a:txBody>
                     <a:bodyPr/>
@@ -8637,12 +8833,12 @@
                     <a:p>
                       <a:pPr algn="l" fontAlgn="b"/>
                       <a:r>
-                        <a:rPr lang="de-DE" sz="1100" u="none" strike="noStrike">
+                        <a:rPr lang="de-DE" sz="1200" u="none" strike="noStrike">
                           <a:effectLst/>
                         </a:rPr>
-                        <a:t>News erstellen</a:t>
+                        <a:t>einzelne News anzeigen</a:t>
                       </a:r>
-                      <a:endParaRPr lang="de-DE" sz="1100" b="0" i="0" u="none" strike="noStrike">
+                      <a:endParaRPr lang="de-DE" sz="1200" b="0" i="0" u="none" strike="noStrike">
                         <a:solidFill>
                           <a:srgbClr val="000000"/>
                         </a:solidFill>
@@ -8660,12 +8856,12 @@
                     <a:p>
                       <a:pPr algn="ctr" fontAlgn="ctr"/>
                       <a:r>
-                        <a:rPr lang="de-DE" sz="1100" u="none" strike="noStrike">
+                        <a:rPr lang="de-DE" sz="1200" u="none" strike="noStrike">
                           <a:effectLst/>
                         </a:rPr>
                         <a:t>3</a:t>
                       </a:r>
-                      <a:endParaRPr lang="de-DE" sz="1100" b="0" i="0" u="none" strike="noStrike">
+                      <a:endParaRPr lang="de-DE" sz="1200" b="0" i="0" u="none" strike="noStrike">
                         <a:solidFill>
                           <a:srgbClr val="000000"/>
                         </a:solidFill>
@@ -8676,8 +8872,13 @@
                   </a:txBody>
                   <a:tcPr marL="6350" marR="6350" marT="6350" marB="0" anchor="ctr"/>
                 </a:tc>
+                <a:extLst>
+                  <a:ext uri="{0D108BD9-81ED-4DB2-BD59-A6C34878D82A}">
+                    <a16:rowId xmlns:a16="http://schemas.microsoft.com/office/drawing/2014/main" val="10011"/>
+                  </a:ext>
+                </a:extLst>
               </a:tr>
-              <a:tr h="244893">
+              <a:tr h="320249">
                 <a:tc>
                   <a:txBody>
                     <a:bodyPr/>
@@ -8685,12 +8886,12 @@
                     <a:p>
                       <a:pPr algn="l" fontAlgn="b"/>
                       <a:r>
-                        <a:rPr lang="de-DE" sz="1100" u="none" strike="noStrike">
+                        <a:rPr lang="de-DE" sz="1200" u="none" strike="noStrike">
                           <a:effectLst/>
                         </a:rPr>
-                        <a:t>einzelne News anzeigen</a:t>
+                        <a:t>gesehene News anzeigen/ausblenden</a:t>
                       </a:r>
-                      <a:endParaRPr lang="de-DE" sz="1100" b="0" i="0" u="none" strike="noStrike">
+                      <a:endParaRPr lang="de-DE" sz="1200" b="0" i="0" u="none" strike="noStrike">
                         <a:solidFill>
                           <a:srgbClr val="000000"/>
                         </a:solidFill>
@@ -8708,12 +8909,16 @@
                     <a:p>
                       <a:pPr algn="ctr" fontAlgn="ctr"/>
                       <a:r>
-                        <a:rPr lang="de-DE" sz="1100" u="none" strike="noStrike">
+                        <a:rPr lang="de-DE" sz="1200" b="0" i="0" u="none" strike="noStrike" dirty="0">
+                          <a:solidFill>
+                            <a:schemeClr val="dk1"/>
+                          </a:solidFill>
                           <a:effectLst/>
+                          <a:latin typeface="+mn-lt"/>
                         </a:rPr>
-                        <a:t>3</a:t>
+                        <a:t>2</a:t>
                       </a:r>
-                      <a:endParaRPr lang="de-DE" sz="1100" b="0" i="0" u="none" strike="noStrike">
+                      <a:endParaRPr lang="de-DE" sz="1200" b="0" i="0" u="none" strike="noStrike" dirty="0">
                         <a:solidFill>
                           <a:srgbClr val="000000"/>
                         </a:solidFill>
@@ -8724,54 +8929,11 @@
                   </a:txBody>
                   <a:tcPr marL="6350" marR="6350" marT="6350" marB="0" anchor="ctr"/>
                 </a:tc>
-              </a:tr>
-              <a:tr h="244893">
-                <a:tc>
-                  <a:txBody>
-                    <a:bodyPr/>
-                    <a:lstStyle/>
-                    <a:p>
-                      <a:pPr algn="l" fontAlgn="b"/>
-                      <a:r>
-                        <a:rPr lang="de-DE" sz="1100" u="none" strike="noStrike">
-                          <a:effectLst/>
-                        </a:rPr>
-                        <a:t>gesehene News anzeigen/ausblenden</a:t>
-                      </a:r>
-                      <a:endParaRPr lang="de-DE" sz="1100" b="0" i="0" u="none" strike="noStrike">
-                        <a:solidFill>
-                          <a:srgbClr val="000000"/>
-                        </a:solidFill>
-                        <a:effectLst/>
-                        <a:latin typeface="Calibri" charset="0"/>
-                      </a:endParaRPr>
-                    </a:p>
-                  </a:txBody>
-                  <a:tcPr marL="6350" marR="6350" marT="6350" marB="0" anchor="b"/>
-                </a:tc>
-                <a:tc>
-                  <a:txBody>
-                    <a:bodyPr/>
-                    <a:lstStyle/>
-                    <a:p>
-                      <a:pPr algn="ctr" fontAlgn="ctr"/>
-                      <a:r>
-                        <a:rPr lang="de-DE" sz="1100" u="none" strike="noStrike" dirty="0">
-                          <a:effectLst/>
-                        </a:rPr>
-                        <a:t>1</a:t>
-                      </a:r>
-                      <a:endParaRPr lang="de-DE" sz="1100" b="0" i="0" u="none" strike="noStrike" dirty="0">
-                        <a:solidFill>
-                          <a:srgbClr val="000000"/>
-                        </a:solidFill>
-                        <a:effectLst/>
-                        <a:latin typeface="Calibri" charset="0"/>
-                      </a:endParaRPr>
-                    </a:p>
-                  </a:txBody>
-                  <a:tcPr marL="6350" marR="6350" marT="6350" marB="0" anchor="ctr"/>
-                </a:tc>
+                <a:extLst>
+                  <a:ext uri="{0D108BD9-81ED-4DB2-BD59-A6C34878D82A}">
+                    <a16:rowId xmlns:a16="http://schemas.microsoft.com/office/drawing/2014/main" val="10012"/>
+                  </a:ext>
+                </a:extLst>
               </a:tr>
             </a:tbl>
           </a:graphicData>

</xml_diff>